<commit_message>
Edits to example 1 in the supplementary materials
</commit_message>
<xml_diff>
--- a/figs/Table1_Fig1.pptx
+++ b/figs/Table1_Fig1.pptx
@@ -8670,33 +8670,33 @@
                     <a:p>
                       <a:pPr rtl="0" fontAlgn="ctr"/>
                       <a:r>
-                        <a:rPr lang="en-US" sz="1400" b="0">
+                        <a:rPr lang="en-US" sz="1400" b="0" dirty="0">
                           <a:effectLst/>
                           <a:latin typeface="Calibri" panose="020F0502020204030204" pitchFamily="34" charset="0"/>
                         </a:rPr>
                         <a:t>Latency to approach simulated intruder or predator</a:t>
                       </a:r>
                       <a:br>
-                        <a:rPr lang="en-US" sz="1400" b="0">
+                        <a:rPr lang="en-US" sz="1400" b="0" dirty="0">
                           <a:effectLst/>
                           <a:latin typeface="Calibri" panose="020F0502020204030204" pitchFamily="34" charset="0"/>
                         </a:rPr>
                       </a:br>
                       <a:r>
-                        <a:rPr lang="en-US" sz="1400" b="0">
+                        <a:rPr lang="en-US" sz="1400" b="0" dirty="0">
                           <a:effectLst/>
                           <a:latin typeface="Calibri" panose="020F0502020204030204" pitchFamily="34" charset="0"/>
                         </a:rPr>
                         <a:t>Latency to forage</a:t>
                       </a:r>
                       <a:br>
-                        <a:rPr lang="en-US" sz="1400" b="0">
+                        <a:rPr lang="en-US" sz="1400" b="0" dirty="0">
                           <a:effectLst/>
                           <a:latin typeface="Calibri" panose="020F0502020204030204" pitchFamily="34" charset="0"/>
                         </a:rPr>
                       </a:br>
                       <a:r>
-                        <a:rPr lang="en-US" sz="1400" b="0">
+                        <a:rPr lang="en-US" sz="1400" b="0" dirty="0">
                           <a:effectLst/>
                           <a:latin typeface="Calibri" panose="020F0502020204030204" pitchFamily="34" charset="0"/>
                         </a:rPr>

</xml_diff>

<commit_message>
Increased number of boot sims to 10,000
</commit_message>
<xml_diff>
--- a/figs/Table1_Fig1.pptx
+++ b/figs/Table1_Fig1.pptx
@@ -5149,7 +5149,7 @@
           <a:p>
             <a:fld id="{FB4EE7D7-6136-1147-9BB7-D2C691C182E3}" type="datetimeFigureOut">
               <a:rPr lang="en-US" smtClean="0"/>
-              <a:t>7/8/24</a:t>
+              <a:t>7/20/24</a:t>
             </a:fld>
             <a:endParaRPr lang="en-US"/>
           </a:p>
@@ -5347,7 +5347,7 @@
           <a:p>
             <a:fld id="{FB4EE7D7-6136-1147-9BB7-D2C691C182E3}" type="datetimeFigureOut">
               <a:rPr lang="en-US" smtClean="0"/>
-              <a:t>7/8/24</a:t>
+              <a:t>7/20/24</a:t>
             </a:fld>
             <a:endParaRPr lang="en-US"/>
           </a:p>
@@ -5555,7 +5555,7 @@
           <a:p>
             <a:fld id="{FB4EE7D7-6136-1147-9BB7-D2C691C182E3}" type="datetimeFigureOut">
               <a:rPr lang="en-US" smtClean="0"/>
-              <a:t>7/8/24</a:t>
+              <a:t>7/20/24</a:t>
             </a:fld>
             <a:endParaRPr lang="en-US"/>
           </a:p>
@@ -5753,7 +5753,7 @@
           <a:p>
             <a:fld id="{FB4EE7D7-6136-1147-9BB7-D2C691C182E3}" type="datetimeFigureOut">
               <a:rPr lang="en-US" smtClean="0"/>
-              <a:t>7/8/24</a:t>
+              <a:t>7/20/24</a:t>
             </a:fld>
             <a:endParaRPr lang="en-US"/>
           </a:p>
@@ -6028,7 +6028,7 @@
           <a:p>
             <a:fld id="{FB4EE7D7-6136-1147-9BB7-D2C691C182E3}" type="datetimeFigureOut">
               <a:rPr lang="en-US" smtClean="0"/>
-              <a:t>7/8/24</a:t>
+              <a:t>7/20/24</a:t>
             </a:fld>
             <a:endParaRPr lang="en-US"/>
           </a:p>
@@ -6293,7 +6293,7 @@
           <a:p>
             <a:fld id="{FB4EE7D7-6136-1147-9BB7-D2C691C182E3}" type="datetimeFigureOut">
               <a:rPr lang="en-US" smtClean="0"/>
-              <a:t>7/8/24</a:t>
+              <a:t>7/20/24</a:t>
             </a:fld>
             <a:endParaRPr lang="en-US"/>
           </a:p>
@@ -6705,7 +6705,7 @@
           <a:p>
             <a:fld id="{FB4EE7D7-6136-1147-9BB7-D2C691C182E3}" type="datetimeFigureOut">
               <a:rPr lang="en-US" smtClean="0"/>
-              <a:t>7/8/24</a:t>
+              <a:t>7/20/24</a:t>
             </a:fld>
             <a:endParaRPr lang="en-US"/>
           </a:p>
@@ -6846,7 +6846,7 @@
           <a:p>
             <a:fld id="{FB4EE7D7-6136-1147-9BB7-D2C691C182E3}" type="datetimeFigureOut">
               <a:rPr lang="en-US" smtClean="0"/>
-              <a:t>7/8/24</a:t>
+              <a:t>7/20/24</a:t>
             </a:fld>
             <a:endParaRPr lang="en-US"/>
           </a:p>
@@ -6959,7 +6959,7 @@
           <a:p>
             <a:fld id="{FB4EE7D7-6136-1147-9BB7-D2C691C182E3}" type="datetimeFigureOut">
               <a:rPr lang="en-US" smtClean="0"/>
-              <a:t>7/8/24</a:t>
+              <a:t>7/20/24</a:t>
             </a:fld>
             <a:endParaRPr lang="en-US"/>
           </a:p>
@@ -7270,7 +7270,7 @@
           <a:p>
             <a:fld id="{FB4EE7D7-6136-1147-9BB7-D2C691C182E3}" type="datetimeFigureOut">
               <a:rPr lang="en-US" smtClean="0"/>
-              <a:t>7/8/24</a:t>
+              <a:t>7/20/24</a:t>
             </a:fld>
             <a:endParaRPr lang="en-US"/>
           </a:p>
@@ -7558,7 +7558,7 @@
           <a:p>
             <a:fld id="{FB4EE7D7-6136-1147-9BB7-D2C691C182E3}" type="datetimeFigureOut">
               <a:rPr lang="en-US" smtClean="0"/>
-              <a:t>7/8/24</a:t>
+              <a:t>7/20/24</a:t>
             </a:fld>
             <a:endParaRPr lang="en-US"/>
           </a:p>
@@ -7799,7 +7799,7 @@
           <a:p>
             <a:fld id="{FB4EE7D7-6136-1147-9BB7-D2C691C182E3}" type="datetimeFigureOut">
               <a:rPr lang="en-US" smtClean="0"/>
-              <a:t>7/8/24</a:t>
+              <a:t>7/20/24</a:t>
             </a:fld>
             <a:endParaRPr lang="en-US"/>
           </a:p>
@@ -9874,16 +9874,6 @@
                     <a:p>
                       <a:pPr rtl="0" fontAlgn="ctr"/>
                       <a:r>
-                        <a:rPr lang="en-US" sz="1400" b="0" dirty="0" err="1">
-                          <a:solidFill>
-                            <a:srgbClr val="1F1F1F"/>
-                          </a:solidFill>
-                          <a:effectLst/>
-                          <a:latin typeface="Calibri" panose="020F0502020204030204" pitchFamily="34" charset="0"/>
-                        </a:rPr>
-                        <a:t>Waser</a:t>
-                      </a:r>
-                      <a:r>
                         <a:rPr lang="en-US" sz="1400" b="0" dirty="0">
                           <a:solidFill>
                             <a:srgbClr val="1F1F1F"/>
@@ -9891,7 +9881,7 @@
                           <a:effectLst/>
                           <a:latin typeface="Calibri" panose="020F0502020204030204" pitchFamily="34" charset="0"/>
                         </a:rPr>
-                        <a:t> et al. 2000</a:t>
+                        <a:t>Waser et al. 2000</a:t>
                       </a:r>
                       <a:br>
                         <a:rPr lang="en-US" sz="1400" b="0" dirty="0">
@@ -9910,27 +9900,7 @@
                           <a:effectLst/>
                           <a:latin typeface="Calibri" panose="020F0502020204030204" pitchFamily="34" charset="0"/>
                         </a:rPr>
-                        <a:t>Villagomez et al. 2021; </a:t>
-                      </a:r>
-                      <a:r>
-                        <a:rPr lang="en-US" sz="1400" b="0" dirty="0" err="1">
-                          <a:solidFill>
-                            <a:srgbClr val="1F1F1F"/>
-                          </a:solidFill>
-                          <a:effectLst/>
-                          <a:latin typeface="Calibri" panose="020F0502020204030204" pitchFamily="34" charset="0"/>
-                        </a:rPr>
-                        <a:t>Manincor</a:t>
-                      </a:r>
-                      <a:r>
-                        <a:rPr lang="en-US" sz="1400" b="0" dirty="0">
-                          <a:solidFill>
-                            <a:srgbClr val="1F1F1F"/>
-                          </a:solidFill>
-                          <a:effectLst/>
-                          <a:latin typeface="Calibri" panose="020F0502020204030204" pitchFamily="34" charset="0"/>
-                        </a:rPr>
-                        <a:t> et al. 2023</a:t>
+                        <a:t>Villagomez et al. 2021; Manincor et al. 2023</a:t>
                       </a:r>
                       <a:br>
                         <a:rPr lang="en-US" sz="1400" b="0" dirty="0">
@@ -9949,27 +9919,7 @@
                           <a:effectLst/>
                           <a:latin typeface="Calibri" panose="020F0502020204030204" pitchFamily="34" charset="0"/>
                         </a:rPr>
-                        <a:t>Villagomez et al. 2021; </a:t>
-                      </a:r>
-                      <a:r>
-                        <a:rPr lang="en-US" sz="1400" b="0" dirty="0" err="1">
-                          <a:solidFill>
-                            <a:srgbClr val="1F1F1F"/>
-                          </a:solidFill>
-                          <a:effectLst/>
-                          <a:latin typeface="Calibri" panose="020F0502020204030204" pitchFamily="34" charset="0"/>
-                        </a:rPr>
-                        <a:t>Manincor</a:t>
-                      </a:r>
-                      <a:r>
-                        <a:rPr lang="en-US" sz="1400" b="0" dirty="0">
-                          <a:solidFill>
-                            <a:srgbClr val="1F1F1F"/>
-                          </a:solidFill>
-                          <a:effectLst/>
-                          <a:latin typeface="Calibri" panose="020F0502020204030204" pitchFamily="34" charset="0"/>
-                        </a:rPr>
-                        <a:t> et al. 2023</a:t>
+                        <a:t>Villagomez et al. 2021; Manincor et al. 2023</a:t>
                       </a:r>
                     </a:p>
                   </a:txBody>

</xml_diff>